<commit_message>
update man and logo
</commit_message>
<xml_diff>
--- a/man/figures/logo.pptx
+++ b/man/figures/logo.pptx
@@ -4,6 +4,9 @@
   <p:sldMasterIdLst>
     <p:sldMasterId id="2147483648" r:id="rId1"/>
   </p:sldMasterIdLst>
+  <p:notesMasterIdLst>
+    <p:notesMasterId r:id="rId9"/>
+  </p:notesMasterIdLst>
   <p:sldIdLst>
     <p:sldId id="257" r:id="rId2"/>
     <p:sldId id="256" r:id="rId3"/>
@@ -129,6 +132,439 @@
 </p:presentation>
 </file>
 
+<file path=ppt/notesMasters/notesMaster1.xml><?xml version="1.0" encoding="utf-8"?>
+<p:notesMaster xmlns:a="http://schemas.openxmlformats.org/drawingml/2006/main" xmlns:r="http://schemas.openxmlformats.org/officeDocument/2006/relationships" xmlns:p="http://schemas.openxmlformats.org/presentationml/2006/main">
+  <p:cSld>
+    <p:bg>
+      <p:bgRef idx="1001">
+        <a:schemeClr val="bg1"/>
+      </p:bgRef>
+    </p:bg>
+    <p:spTree>
+      <p:nvGrpSpPr>
+        <p:cNvPr id="1" name=""/>
+        <p:cNvGrpSpPr/>
+        <p:nvPr/>
+      </p:nvGrpSpPr>
+      <p:grpSpPr>
+        <a:xfrm>
+          <a:off x="0" y="0"/>
+          <a:ext cx="0" cy="0"/>
+          <a:chOff x="0" y="0"/>
+          <a:chExt cx="0" cy="0"/>
+        </a:xfrm>
+      </p:grpSpPr>
+      <p:sp>
+        <p:nvSpPr>
+          <p:cNvPr id="2" name="Header Placeholder 1"/>
+          <p:cNvSpPr>
+            <a:spLocks noGrp="1"/>
+          </p:cNvSpPr>
+          <p:nvPr>
+            <p:ph type="hdr" sz="quarter"/>
+          </p:nvPr>
+        </p:nvSpPr>
+        <p:spPr>
+          <a:xfrm>
+            <a:off x="0" y="0"/>
+            <a:ext cx="2971800" cy="458788"/>
+          </a:xfrm>
+          <a:prstGeom prst="rect">
+            <a:avLst/>
+          </a:prstGeom>
+        </p:spPr>
+        <p:txBody>
+          <a:bodyPr vert="horz" lIns="91440" tIns="45720" rIns="91440" bIns="45720" rtlCol="0"/>
+          <a:lstStyle>
+            <a:lvl1pPr algn="l">
+              <a:defRPr sz="1200"/>
+            </a:lvl1pPr>
+          </a:lstStyle>
+          <a:p>
+            <a:endParaRPr lang="en-US"/>
+          </a:p>
+        </p:txBody>
+      </p:sp>
+      <p:sp>
+        <p:nvSpPr>
+          <p:cNvPr id="3" name="Date Placeholder 2"/>
+          <p:cNvSpPr>
+            <a:spLocks noGrp="1"/>
+          </p:cNvSpPr>
+          <p:nvPr>
+            <p:ph type="dt" idx="1"/>
+          </p:nvPr>
+        </p:nvSpPr>
+        <p:spPr>
+          <a:xfrm>
+            <a:off x="3884613" y="0"/>
+            <a:ext cx="2971800" cy="458788"/>
+          </a:xfrm>
+          <a:prstGeom prst="rect">
+            <a:avLst/>
+          </a:prstGeom>
+        </p:spPr>
+        <p:txBody>
+          <a:bodyPr vert="horz" lIns="91440" tIns="45720" rIns="91440" bIns="45720" rtlCol="0"/>
+          <a:lstStyle>
+            <a:lvl1pPr algn="r">
+              <a:defRPr sz="1200"/>
+            </a:lvl1pPr>
+          </a:lstStyle>
+          <a:p>
+            <a:fld id="{059146B1-42C7-BB4F-8EDA-3C3AB353DEB6}" type="datetimeFigureOut">
+              <a:rPr lang="en-US" smtClean="0"/>
+              <a:t>8/21/20</a:t>
+            </a:fld>
+            <a:endParaRPr lang="en-US"/>
+          </a:p>
+        </p:txBody>
+      </p:sp>
+      <p:sp>
+        <p:nvSpPr>
+          <p:cNvPr id="4" name="Slide Image Placeholder 3"/>
+          <p:cNvSpPr>
+            <a:spLocks noGrp="1" noRot="1" noChangeAspect="1"/>
+          </p:cNvSpPr>
+          <p:nvPr>
+            <p:ph type="sldImg" idx="2"/>
+          </p:nvPr>
+        </p:nvSpPr>
+        <p:spPr>
+          <a:xfrm>
+            <a:off x="685800" y="1143000"/>
+            <a:ext cx="5486400" cy="3086100"/>
+          </a:xfrm>
+          <a:prstGeom prst="rect">
+            <a:avLst/>
+          </a:prstGeom>
+          <a:noFill/>
+          <a:ln w="12700">
+            <a:solidFill>
+              <a:prstClr val="black"/>
+            </a:solidFill>
+          </a:ln>
+        </p:spPr>
+        <p:txBody>
+          <a:bodyPr vert="horz" lIns="91440" tIns="45720" rIns="91440" bIns="45720" rtlCol="0" anchor="ctr"/>
+          <a:lstStyle/>
+          <a:p>
+            <a:endParaRPr lang="en-US"/>
+          </a:p>
+        </p:txBody>
+      </p:sp>
+      <p:sp>
+        <p:nvSpPr>
+          <p:cNvPr id="5" name="Notes Placeholder 4"/>
+          <p:cNvSpPr>
+            <a:spLocks noGrp="1"/>
+          </p:cNvSpPr>
+          <p:nvPr>
+            <p:ph type="body" sz="quarter" idx="3"/>
+          </p:nvPr>
+        </p:nvSpPr>
+        <p:spPr>
+          <a:xfrm>
+            <a:off x="685800" y="4400550"/>
+            <a:ext cx="5486400" cy="3600450"/>
+          </a:xfrm>
+          <a:prstGeom prst="rect">
+            <a:avLst/>
+          </a:prstGeom>
+        </p:spPr>
+        <p:txBody>
+          <a:bodyPr vert="horz" lIns="91440" tIns="45720" rIns="91440" bIns="45720" rtlCol="0"/>
+          <a:lstStyle/>
+          <a:p>
+            <a:pPr lvl="0"/>
+            <a:r>
+              <a:rPr lang="en-US"/>
+              <a:t>Click to edit Master text styles</a:t>
+            </a:r>
+          </a:p>
+          <a:p>
+            <a:pPr lvl="1"/>
+            <a:r>
+              <a:rPr lang="en-US"/>
+              <a:t>Second level</a:t>
+            </a:r>
+          </a:p>
+          <a:p>
+            <a:pPr lvl="2"/>
+            <a:r>
+              <a:rPr lang="en-US"/>
+              <a:t>Third level</a:t>
+            </a:r>
+          </a:p>
+          <a:p>
+            <a:pPr lvl="3"/>
+            <a:r>
+              <a:rPr lang="en-US"/>
+              <a:t>Fourth level</a:t>
+            </a:r>
+          </a:p>
+          <a:p>
+            <a:pPr lvl="4"/>
+            <a:r>
+              <a:rPr lang="en-US"/>
+              <a:t>Fifth level</a:t>
+            </a:r>
+          </a:p>
+        </p:txBody>
+      </p:sp>
+      <p:sp>
+        <p:nvSpPr>
+          <p:cNvPr id="6" name="Footer Placeholder 5"/>
+          <p:cNvSpPr>
+            <a:spLocks noGrp="1"/>
+          </p:cNvSpPr>
+          <p:nvPr>
+            <p:ph type="ftr" sz="quarter" idx="4"/>
+          </p:nvPr>
+        </p:nvSpPr>
+        <p:spPr>
+          <a:xfrm>
+            <a:off x="0" y="8685213"/>
+            <a:ext cx="2971800" cy="458787"/>
+          </a:xfrm>
+          <a:prstGeom prst="rect">
+            <a:avLst/>
+          </a:prstGeom>
+        </p:spPr>
+        <p:txBody>
+          <a:bodyPr vert="horz" lIns="91440" tIns="45720" rIns="91440" bIns="45720" rtlCol="0" anchor="b"/>
+          <a:lstStyle>
+            <a:lvl1pPr algn="l">
+              <a:defRPr sz="1200"/>
+            </a:lvl1pPr>
+          </a:lstStyle>
+          <a:p>
+            <a:endParaRPr lang="en-US"/>
+          </a:p>
+        </p:txBody>
+      </p:sp>
+      <p:sp>
+        <p:nvSpPr>
+          <p:cNvPr id="7" name="Slide Number Placeholder 6"/>
+          <p:cNvSpPr>
+            <a:spLocks noGrp="1"/>
+          </p:cNvSpPr>
+          <p:nvPr>
+            <p:ph type="sldNum" sz="quarter" idx="5"/>
+          </p:nvPr>
+        </p:nvSpPr>
+        <p:spPr>
+          <a:xfrm>
+            <a:off x="3884613" y="8685213"/>
+            <a:ext cx="2971800" cy="458787"/>
+          </a:xfrm>
+          <a:prstGeom prst="rect">
+            <a:avLst/>
+          </a:prstGeom>
+        </p:spPr>
+        <p:txBody>
+          <a:bodyPr vert="horz" lIns="91440" tIns="45720" rIns="91440" bIns="45720" rtlCol="0" anchor="b"/>
+          <a:lstStyle>
+            <a:lvl1pPr algn="r">
+              <a:defRPr sz="1200"/>
+            </a:lvl1pPr>
+          </a:lstStyle>
+          <a:p>
+            <a:fld id="{C476D97D-7C02-874C-B5FA-CC2928F4B0D6}" type="slidenum">
+              <a:rPr lang="en-US" smtClean="0"/>
+              <a:t>‹#›</a:t>
+            </a:fld>
+            <a:endParaRPr lang="en-US"/>
+          </a:p>
+        </p:txBody>
+      </p:sp>
+    </p:spTree>
+    <p:extLst>
+      <p:ext uri="{BB962C8B-B14F-4D97-AF65-F5344CB8AC3E}">
+        <p14:creationId xmlns:p14="http://schemas.microsoft.com/office/powerpoint/2010/main" val="688251556"/>
+      </p:ext>
+    </p:extLst>
+  </p:cSld>
+  <p:clrMap bg1="lt1" tx1="dk1" bg2="lt2" tx2="dk2" accent1="accent1" accent2="accent2" accent3="accent3" accent4="accent4" accent5="accent5" accent6="accent6" hlink="hlink" folHlink="folHlink"/>
+  <p:notesStyle>
+    <a:lvl1pPr marL="0" algn="l" defTabSz="914400" rtl="0" eaLnBrk="1" latinLnBrk="0" hangingPunct="1">
+      <a:defRPr sz="1200" kern="1200">
+        <a:solidFill>
+          <a:schemeClr val="tx1"/>
+        </a:solidFill>
+        <a:latin typeface="+mn-lt"/>
+        <a:ea typeface="+mn-ea"/>
+        <a:cs typeface="+mn-cs"/>
+      </a:defRPr>
+    </a:lvl1pPr>
+    <a:lvl2pPr marL="457200" algn="l" defTabSz="914400" rtl="0" eaLnBrk="1" latinLnBrk="0" hangingPunct="1">
+      <a:defRPr sz="1200" kern="1200">
+        <a:solidFill>
+          <a:schemeClr val="tx1"/>
+        </a:solidFill>
+        <a:latin typeface="+mn-lt"/>
+        <a:ea typeface="+mn-ea"/>
+        <a:cs typeface="+mn-cs"/>
+      </a:defRPr>
+    </a:lvl2pPr>
+    <a:lvl3pPr marL="914400" algn="l" defTabSz="914400" rtl="0" eaLnBrk="1" latinLnBrk="0" hangingPunct="1">
+      <a:defRPr sz="1200" kern="1200">
+        <a:solidFill>
+          <a:schemeClr val="tx1"/>
+        </a:solidFill>
+        <a:latin typeface="+mn-lt"/>
+        <a:ea typeface="+mn-ea"/>
+        <a:cs typeface="+mn-cs"/>
+      </a:defRPr>
+    </a:lvl3pPr>
+    <a:lvl4pPr marL="1371600" algn="l" defTabSz="914400" rtl="0" eaLnBrk="1" latinLnBrk="0" hangingPunct="1">
+      <a:defRPr sz="1200" kern="1200">
+        <a:solidFill>
+          <a:schemeClr val="tx1"/>
+        </a:solidFill>
+        <a:latin typeface="+mn-lt"/>
+        <a:ea typeface="+mn-ea"/>
+        <a:cs typeface="+mn-cs"/>
+      </a:defRPr>
+    </a:lvl4pPr>
+    <a:lvl5pPr marL="1828800" algn="l" defTabSz="914400" rtl="0" eaLnBrk="1" latinLnBrk="0" hangingPunct="1">
+      <a:defRPr sz="1200" kern="1200">
+        <a:solidFill>
+          <a:schemeClr val="tx1"/>
+        </a:solidFill>
+        <a:latin typeface="+mn-lt"/>
+        <a:ea typeface="+mn-ea"/>
+        <a:cs typeface="+mn-cs"/>
+      </a:defRPr>
+    </a:lvl5pPr>
+    <a:lvl6pPr marL="2286000" algn="l" defTabSz="914400" rtl="0" eaLnBrk="1" latinLnBrk="0" hangingPunct="1">
+      <a:defRPr sz="1200" kern="1200">
+        <a:solidFill>
+          <a:schemeClr val="tx1"/>
+        </a:solidFill>
+        <a:latin typeface="+mn-lt"/>
+        <a:ea typeface="+mn-ea"/>
+        <a:cs typeface="+mn-cs"/>
+      </a:defRPr>
+    </a:lvl6pPr>
+    <a:lvl7pPr marL="2743200" algn="l" defTabSz="914400" rtl="0" eaLnBrk="1" latinLnBrk="0" hangingPunct="1">
+      <a:defRPr sz="1200" kern="1200">
+        <a:solidFill>
+          <a:schemeClr val="tx1"/>
+        </a:solidFill>
+        <a:latin typeface="+mn-lt"/>
+        <a:ea typeface="+mn-ea"/>
+        <a:cs typeface="+mn-cs"/>
+      </a:defRPr>
+    </a:lvl7pPr>
+    <a:lvl8pPr marL="3200400" algn="l" defTabSz="914400" rtl="0" eaLnBrk="1" latinLnBrk="0" hangingPunct="1">
+      <a:defRPr sz="1200" kern="1200">
+        <a:solidFill>
+          <a:schemeClr val="tx1"/>
+        </a:solidFill>
+        <a:latin typeface="+mn-lt"/>
+        <a:ea typeface="+mn-ea"/>
+        <a:cs typeface="+mn-cs"/>
+      </a:defRPr>
+    </a:lvl8pPr>
+    <a:lvl9pPr marL="3657600" algn="l" defTabSz="914400" rtl="0" eaLnBrk="1" latinLnBrk="0" hangingPunct="1">
+      <a:defRPr sz="1200" kern="1200">
+        <a:solidFill>
+          <a:schemeClr val="tx1"/>
+        </a:solidFill>
+        <a:latin typeface="+mn-lt"/>
+        <a:ea typeface="+mn-ea"/>
+        <a:cs typeface="+mn-cs"/>
+      </a:defRPr>
+    </a:lvl9pPr>
+  </p:notesStyle>
+</p:notesMaster>
+</file>
+
+<file path=ppt/notesSlides/notesSlide1.xml><?xml version="1.0" encoding="utf-8"?>
+<p:notes xmlns:a="http://schemas.openxmlformats.org/drawingml/2006/main" xmlns:r="http://schemas.openxmlformats.org/officeDocument/2006/relationships" xmlns:p="http://schemas.openxmlformats.org/presentationml/2006/main">
+  <p:cSld>
+    <p:spTree>
+      <p:nvGrpSpPr>
+        <p:cNvPr id="1" name=""/>
+        <p:cNvGrpSpPr/>
+        <p:nvPr/>
+      </p:nvGrpSpPr>
+      <p:grpSpPr>
+        <a:xfrm>
+          <a:off x="0" y="0"/>
+          <a:ext cx="0" cy="0"/>
+          <a:chOff x="0" y="0"/>
+          <a:chExt cx="0" cy="0"/>
+        </a:xfrm>
+      </p:grpSpPr>
+      <p:sp>
+        <p:nvSpPr>
+          <p:cNvPr id="2" name="Slide Image Placeholder 1"/>
+          <p:cNvSpPr>
+            <a:spLocks noGrp="1" noRot="1" noChangeAspect="1"/>
+          </p:cNvSpPr>
+          <p:nvPr>
+            <p:ph type="sldImg"/>
+          </p:nvPr>
+        </p:nvSpPr>
+        <p:spPr/>
+      </p:sp>
+      <p:sp>
+        <p:nvSpPr>
+          <p:cNvPr id="3" name="Notes Placeholder 2"/>
+          <p:cNvSpPr>
+            <a:spLocks noGrp="1"/>
+          </p:cNvSpPr>
+          <p:nvPr>
+            <p:ph type="body" idx="1"/>
+          </p:nvPr>
+        </p:nvSpPr>
+        <p:spPr/>
+        <p:txBody>
+          <a:bodyPr/>
+          <a:lstStyle/>
+          <a:p>
+            <a:endParaRPr lang="en-US" dirty="0"/>
+          </a:p>
+        </p:txBody>
+      </p:sp>
+      <p:sp>
+        <p:nvSpPr>
+          <p:cNvPr id="4" name="Slide Number Placeholder 3"/>
+          <p:cNvSpPr>
+            <a:spLocks noGrp="1"/>
+          </p:cNvSpPr>
+          <p:nvPr>
+            <p:ph type="sldNum" sz="quarter" idx="5"/>
+          </p:nvPr>
+        </p:nvSpPr>
+        <p:spPr/>
+        <p:txBody>
+          <a:bodyPr/>
+          <a:lstStyle/>
+          <a:p>
+            <a:fld id="{C476D97D-7C02-874C-B5FA-CC2928F4B0D6}" type="slidenum">
+              <a:rPr lang="en-US" smtClean="0"/>
+              <a:t>7</a:t>
+            </a:fld>
+            <a:endParaRPr lang="en-US"/>
+          </a:p>
+        </p:txBody>
+      </p:sp>
+    </p:spTree>
+    <p:extLst>
+      <p:ext uri="{BB962C8B-B14F-4D97-AF65-F5344CB8AC3E}">
+        <p14:creationId xmlns:p14="http://schemas.microsoft.com/office/powerpoint/2010/main" val="1638229128"/>
+      </p:ext>
+    </p:extLst>
+  </p:cSld>
+  <p:clrMapOvr>
+    <a:masterClrMapping/>
+  </p:clrMapOvr>
+</p:notes>
+</file>
+
 <file path=ppt/slideLayouts/slideLayout1.xml><?xml version="1.0" encoding="utf-8"?>
 <p:sldLayout xmlns:a="http://schemas.openxmlformats.org/drawingml/2006/main" xmlns:r="http://schemas.openxmlformats.org/officeDocument/2006/relationships" xmlns:p="http://schemas.openxmlformats.org/presentationml/2006/main" type="title" preserve="1">
   <p:cSld name="Title Slide">
@@ -276,7 +712,7 @@
           <a:p>
             <a:fld id="{E83CB364-2EEF-194A-840B-CEE7F5B69797}" type="datetimeFigureOut">
               <a:rPr lang="en-US" smtClean="0"/>
-              <a:t>8/20/20</a:t>
+              <a:t>8/21/20</a:t>
             </a:fld>
             <a:endParaRPr lang="en-US"/>
           </a:p>
@@ -474,7 +910,7 @@
           <a:p>
             <a:fld id="{E83CB364-2EEF-194A-840B-CEE7F5B69797}" type="datetimeFigureOut">
               <a:rPr lang="en-US" smtClean="0"/>
-              <a:t>8/20/20</a:t>
+              <a:t>8/21/20</a:t>
             </a:fld>
             <a:endParaRPr lang="en-US"/>
           </a:p>
@@ -682,7 +1118,7 @@
           <a:p>
             <a:fld id="{E83CB364-2EEF-194A-840B-CEE7F5B69797}" type="datetimeFigureOut">
               <a:rPr lang="en-US" smtClean="0"/>
-              <a:t>8/20/20</a:t>
+              <a:t>8/21/20</a:t>
             </a:fld>
             <a:endParaRPr lang="en-US"/>
           </a:p>
@@ -880,7 +1316,7 @@
           <a:p>
             <a:fld id="{E83CB364-2EEF-194A-840B-CEE7F5B69797}" type="datetimeFigureOut">
               <a:rPr lang="en-US" smtClean="0"/>
-              <a:t>8/20/20</a:t>
+              <a:t>8/21/20</a:t>
             </a:fld>
             <a:endParaRPr lang="en-US"/>
           </a:p>
@@ -1155,7 +1591,7 @@
           <a:p>
             <a:fld id="{E83CB364-2EEF-194A-840B-CEE7F5B69797}" type="datetimeFigureOut">
               <a:rPr lang="en-US" smtClean="0"/>
-              <a:t>8/20/20</a:t>
+              <a:t>8/21/20</a:t>
             </a:fld>
             <a:endParaRPr lang="en-US"/>
           </a:p>
@@ -1420,7 +1856,7 @@
           <a:p>
             <a:fld id="{E83CB364-2EEF-194A-840B-CEE7F5B69797}" type="datetimeFigureOut">
               <a:rPr lang="en-US" smtClean="0"/>
-              <a:t>8/20/20</a:t>
+              <a:t>8/21/20</a:t>
             </a:fld>
             <a:endParaRPr lang="en-US"/>
           </a:p>
@@ -1832,7 +2268,7 @@
           <a:p>
             <a:fld id="{E83CB364-2EEF-194A-840B-CEE7F5B69797}" type="datetimeFigureOut">
               <a:rPr lang="en-US" smtClean="0"/>
-              <a:t>8/20/20</a:t>
+              <a:t>8/21/20</a:t>
             </a:fld>
             <a:endParaRPr lang="en-US"/>
           </a:p>
@@ -1973,7 +2409,7 @@
           <a:p>
             <a:fld id="{E83CB364-2EEF-194A-840B-CEE7F5B69797}" type="datetimeFigureOut">
               <a:rPr lang="en-US" smtClean="0"/>
-              <a:t>8/20/20</a:t>
+              <a:t>8/21/20</a:t>
             </a:fld>
             <a:endParaRPr lang="en-US"/>
           </a:p>
@@ -2086,7 +2522,7 @@
           <a:p>
             <a:fld id="{E83CB364-2EEF-194A-840B-CEE7F5B69797}" type="datetimeFigureOut">
               <a:rPr lang="en-US" smtClean="0"/>
-              <a:t>8/20/20</a:t>
+              <a:t>8/21/20</a:t>
             </a:fld>
             <a:endParaRPr lang="en-US"/>
           </a:p>
@@ -2397,7 +2833,7 @@
           <a:p>
             <a:fld id="{E83CB364-2EEF-194A-840B-CEE7F5B69797}" type="datetimeFigureOut">
               <a:rPr lang="en-US" smtClean="0"/>
-              <a:t>8/20/20</a:t>
+              <a:t>8/21/20</a:t>
             </a:fld>
             <a:endParaRPr lang="en-US"/>
           </a:p>
@@ -2685,7 +3121,7 @@
           <a:p>
             <a:fld id="{E83CB364-2EEF-194A-840B-CEE7F5B69797}" type="datetimeFigureOut">
               <a:rPr lang="en-US" smtClean="0"/>
-              <a:t>8/20/20</a:t>
+              <a:t>8/21/20</a:t>
             </a:fld>
             <a:endParaRPr lang="en-US"/>
           </a:p>
@@ -2926,7 +3362,7 @@
           <a:p>
             <a:fld id="{E83CB364-2EEF-194A-840B-CEE7F5B69797}" type="datetimeFigureOut">
               <a:rPr lang="en-US" smtClean="0"/>
-              <a:t>8/20/20</a:t>
+              <a:t>8/21/20</a:t>
             </a:fld>
             <a:endParaRPr lang="en-US"/>
           </a:p>
@@ -6366,10 +6802,10 @@
       </p:grpSpPr>
       <p:grpSp>
         <p:nvGrpSpPr>
-          <p:cNvPr id="4" name="Group 3">
+          <p:cNvPr id="16" name="Group 15">
             <a:extLst>
               <a:ext uri="{FF2B5EF4-FFF2-40B4-BE49-F238E27FC236}">
-                <a16:creationId xmlns:a16="http://schemas.microsoft.com/office/drawing/2014/main" id="{7E5874BB-3006-FD40-A57D-C444759849C4}"/>
+                <a16:creationId xmlns:a16="http://schemas.microsoft.com/office/drawing/2014/main" id="{3235E4ED-18C8-6B40-BACB-462B9237588A}"/>
               </a:ext>
             </a:extLst>
           </p:cNvPr>
@@ -6378,9 +6814,9 @@
         </p:nvGrpSpPr>
         <p:grpSpPr>
           <a:xfrm>
-            <a:off x="2952079" y="14046"/>
+            <a:off x="2967181" y="14046"/>
             <a:ext cx="6257633" cy="6829908"/>
-            <a:chOff x="2952079" y="14046"/>
+            <a:chOff x="2967181" y="14046"/>
             <a:chExt cx="6257633" cy="6829908"/>
           </a:xfrm>
         </p:grpSpPr>
@@ -6398,7 +6834,7 @@
           </p:nvSpPr>
           <p:spPr>
             <a:xfrm rot="5400000">
-              <a:off x="2702626" y="611909"/>
+              <a:off x="2717728" y="611909"/>
               <a:ext cx="6756539" cy="5634182"/>
             </a:xfrm>
             <a:prstGeom prst="hexagon">
@@ -6453,7 +6889,7 @@
           </p:nvSpPr>
           <p:spPr>
             <a:xfrm>
-              <a:off x="3124845" y="14046"/>
+              <a:off x="3139947" y="14046"/>
               <a:ext cx="5912100" cy="6829908"/>
             </a:xfrm>
             <a:custGeom>
@@ -6680,432 +7116,69 @@
             </a:p>
           </p:txBody>
         </p:sp>
-        <p:grpSp>
-          <p:nvGrpSpPr>
-            <p:cNvPr id="33" name="Group 32">
+        <p:pic>
+          <p:nvPicPr>
+            <p:cNvPr id="15" name="Graphic 14">
               <a:extLst>
                 <a:ext uri="{FF2B5EF4-FFF2-40B4-BE49-F238E27FC236}">
-                  <a16:creationId xmlns:a16="http://schemas.microsoft.com/office/drawing/2014/main" id="{DE06163F-5E4D-8D41-A0A5-13C7E60221DC}"/>
+                  <a16:creationId xmlns:a16="http://schemas.microsoft.com/office/drawing/2014/main" id="{547FE64B-C65A-834D-9FDE-14298A176060}"/>
                 </a:ext>
               </a:extLst>
             </p:cNvPr>
-            <p:cNvGrpSpPr/>
+            <p:cNvPicPr>
+              <a:picLocks noChangeAspect="1"/>
+            </p:cNvPicPr>
             <p:nvPr/>
-          </p:nvGrpSpPr>
-          <p:grpSpPr>
+          </p:nvPicPr>
+          <p:blipFill>
+            <a:blip r:embed="rId3">
+              <a:extLst>
+                <a:ext uri="{96DAC541-7B7A-43D3-8B79-37D633B846F1}">
+                  <asvg:svgBlip xmlns:asvg="http://schemas.microsoft.com/office/drawing/2016/SVG/main" r:embed="rId4"/>
+                </a:ext>
+              </a:extLst>
+            </a:blip>
+            <a:stretch>
+              <a:fillRect/>
+            </a:stretch>
+          </p:blipFill>
+          <p:spPr>
             <a:xfrm>
-              <a:off x="3793741" y="867037"/>
-              <a:ext cx="4574309" cy="5123926"/>
-              <a:chOff x="3808841" y="849229"/>
-              <a:chExt cx="4574309" cy="5123926"/>
+              <a:off x="5638797" y="738708"/>
+              <a:ext cx="914400" cy="808585"/>
             </a:xfrm>
-          </p:grpSpPr>
-          <p:sp>
-            <p:nvSpPr>
-              <p:cNvPr id="56" name="Oval 55">
-                <a:extLst>
-                  <a:ext uri="{FF2B5EF4-FFF2-40B4-BE49-F238E27FC236}">
-                    <a16:creationId xmlns:a16="http://schemas.microsoft.com/office/drawing/2014/main" id="{29DAC5E5-0C5A-264D-A948-7C425672456C}"/>
-                  </a:ext>
-                </a:extLst>
-              </p:cNvPr>
-              <p:cNvSpPr>
-                <a:spLocks noChangeAspect="1"/>
-              </p:cNvSpPr>
-              <p:nvPr/>
-            </p:nvSpPr>
-            <p:spPr>
-              <a:xfrm>
-                <a:off x="5623731" y="849229"/>
-                <a:ext cx="914400" cy="914400"/>
-              </a:xfrm>
-              <a:prstGeom prst="ellipse">
-                <a:avLst/>
-              </a:prstGeom>
-              <a:noFill/>
-              <a:ln w="381000" cmpd="dbl">
-                <a:solidFill>
-                  <a:schemeClr val="tx1"/>
-                </a:solidFill>
-              </a:ln>
-            </p:spPr>
-            <p:style>
-              <a:lnRef idx="2">
-                <a:schemeClr val="accent1">
-                  <a:shade val="50000"/>
-                </a:schemeClr>
-              </a:lnRef>
-              <a:fillRef idx="1">
-                <a:schemeClr val="accent1"/>
-              </a:fillRef>
-              <a:effectRef idx="0">
-                <a:schemeClr val="accent1"/>
-              </a:effectRef>
-              <a:fontRef idx="minor">
-                <a:schemeClr val="lt1"/>
-              </a:fontRef>
-            </p:style>
-            <p:txBody>
-              <a:bodyPr wrap="none" lIns="0" tIns="0" rIns="0" bIns="0" rtlCol="0" anchor="ctr"/>
-              <a:lstStyle/>
-              <a:p>
-                <a:pPr algn="ctr"/>
-                <a:endParaRPr lang="en-US" sz="2000" b="1" dirty="0">
-                  <a:solidFill>
-                    <a:schemeClr val="tx1"/>
-                  </a:solidFill>
-                  <a:latin typeface="Courier" pitchFamily="2" charset="0"/>
-                </a:endParaRPr>
-              </a:p>
-            </p:txBody>
-          </p:sp>
-          <p:grpSp>
-            <p:nvGrpSpPr>
-              <p:cNvPr id="32" name="Group 31">
-                <a:extLst>
-                  <a:ext uri="{FF2B5EF4-FFF2-40B4-BE49-F238E27FC236}">
-                    <a16:creationId xmlns:a16="http://schemas.microsoft.com/office/drawing/2014/main" id="{0A2700E4-0F64-C744-AF70-B86684BCA28B}"/>
-                  </a:ext>
-                </a:extLst>
-              </p:cNvPr>
-              <p:cNvGrpSpPr/>
-              <p:nvPr/>
-            </p:nvGrpSpPr>
-            <p:grpSpPr>
-              <a:xfrm>
-                <a:off x="3808841" y="1398846"/>
-                <a:ext cx="4574309" cy="4574309"/>
-                <a:chOff x="3808841" y="1398846"/>
-                <a:chExt cx="4574309" cy="4574309"/>
-              </a:xfrm>
-            </p:grpSpPr>
-            <p:pic>
-              <p:nvPicPr>
-                <p:cNvPr id="42" name="Graphic 41" descr="Suit">
-                  <a:extLst>
-                    <a:ext uri="{FF2B5EF4-FFF2-40B4-BE49-F238E27FC236}">
-                      <a16:creationId xmlns:a16="http://schemas.microsoft.com/office/drawing/2014/main" id="{AA38583C-16C4-1D41-B2EA-5B5B919D9A31}"/>
-                    </a:ext>
-                  </a:extLst>
-                </p:cNvPr>
-                <p:cNvPicPr>
-                  <a:picLocks noChangeAspect="1"/>
-                </p:cNvPicPr>
-                <p:nvPr/>
-              </p:nvPicPr>
-              <p:blipFill>
-                <a:blip r:embed="rId2">
-                  <a:extLst>
-                    <a:ext uri="{96DAC541-7B7A-43D3-8B79-37D633B846F1}">
-                      <asvg:svgBlip xmlns:asvg="http://schemas.microsoft.com/office/drawing/2016/SVG/main" r:embed="rId3"/>
-                    </a:ext>
-                  </a:extLst>
-                </a:blip>
-                <a:stretch>
-                  <a:fillRect/>
-                </a:stretch>
-              </p:blipFill>
-              <p:spPr>
-                <a:xfrm>
-                  <a:off x="3808841" y="1398846"/>
-                  <a:ext cx="4574309" cy="4574309"/>
-                </a:xfrm>
-                <a:prstGeom prst="rect">
-                  <a:avLst/>
-                </a:prstGeom>
-              </p:spPr>
-            </p:pic>
-            <p:grpSp>
-              <p:nvGrpSpPr>
-                <p:cNvPr id="9" name="Group 8">
-                  <a:extLst>
-                    <a:ext uri="{FF2B5EF4-FFF2-40B4-BE49-F238E27FC236}">
-                      <a16:creationId xmlns:a16="http://schemas.microsoft.com/office/drawing/2014/main" id="{8470CCBD-A67E-CF4A-86EA-A7B69B9C4E1A}"/>
-                    </a:ext>
-                  </a:extLst>
-                </p:cNvPr>
-                <p:cNvGrpSpPr/>
-                <p:nvPr/>
-              </p:nvGrpSpPr>
-              <p:grpSpPr>
-                <a:xfrm>
-                  <a:off x="6185143" y="2391734"/>
-                  <a:ext cx="914400" cy="613497"/>
-                  <a:chOff x="6291640" y="2218014"/>
-                  <a:chExt cx="914400" cy="613497"/>
-                </a:xfrm>
-              </p:grpSpPr>
-              <p:sp>
-                <p:nvSpPr>
-                  <p:cNvPr id="44" name="Rounded Rectangle 43">
-                    <a:extLst>
-                      <a:ext uri="{FF2B5EF4-FFF2-40B4-BE49-F238E27FC236}">
-                        <a16:creationId xmlns:a16="http://schemas.microsoft.com/office/drawing/2014/main" id="{C582140C-FDB0-B84D-B35E-64582B570A90}"/>
-                      </a:ext>
-                    </a:extLst>
-                  </p:cNvPr>
-                  <p:cNvSpPr/>
-                  <p:nvPr/>
-                </p:nvSpPr>
-                <p:spPr>
-                  <a:xfrm>
-                    <a:off x="6291640" y="2218014"/>
-                    <a:ext cx="914400" cy="613497"/>
-                  </a:xfrm>
-                  <a:prstGeom prst="roundRect">
-                    <a:avLst/>
-                  </a:prstGeom>
-                  <a:solidFill>
-                    <a:srgbClr val="FF0000"/>
-                  </a:solidFill>
-                  <a:ln>
-                    <a:noFill/>
-                  </a:ln>
-                </p:spPr>
-                <p:style>
-                  <a:lnRef idx="2">
-                    <a:schemeClr val="accent1">
-                      <a:shade val="50000"/>
-                    </a:schemeClr>
-                  </a:lnRef>
-                  <a:fillRef idx="1">
-                    <a:schemeClr val="accent1"/>
-                  </a:fillRef>
-                  <a:effectRef idx="0">
-                    <a:schemeClr val="accent1"/>
-                  </a:effectRef>
-                  <a:fontRef idx="minor">
-                    <a:schemeClr val="lt1"/>
-                  </a:fontRef>
-                </p:style>
-                <p:txBody>
-                  <a:bodyPr rtlCol="0" anchor="ctr"/>
-                  <a:lstStyle/>
-                  <a:p>
-                    <a:pPr algn="ctr"/>
-                    <a:endParaRPr lang="en-US" sz="600" i="1" dirty="0"/>
-                  </a:p>
-                </p:txBody>
-              </p:sp>
-              <p:sp>
-                <p:nvSpPr>
-                  <p:cNvPr id="45" name="Rectangle 44">
-                    <a:extLst>
-                      <a:ext uri="{FF2B5EF4-FFF2-40B4-BE49-F238E27FC236}">
-                        <a16:creationId xmlns:a16="http://schemas.microsoft.com/office/drawing/2014/main" id="{07630879-C065-0243-AA6C-664B62D4C3E2}"/>
-                      </a:ext>
-                    </a:extLst>
-                  </p:cNvPr>
-                  <p:cNvSpPr/>
-                  <p:nvPr/>
-                </p:nvSpPr>
-                <p:spPr>
-                  <a:xfrm>
-                    <a:off x="6291640" y="2436852"/>
-                    <a:ext cx="914400" cy="320040"/>
-                  </a:xfrm>
-                  <a:prstGeom prst="rect">
-                    <a:avLst/>
-                  </a:prstGeom>
-                  <a:solidFill>
-                    <a:schemeClr val="bg1"/>
-                  </a:solidFill>
-                  <a:ln>
-                    <a:noFill/>
-                  </a:ln>
-                </p:spPr>
-                <p:style>
-                  <a:lnRef idx="2">
-                    <a:schemeClr val="accent1">
-                      <a:shade val="50000"/>
-                    </a:schemeClr>
-                  </a:lnRef>
-                  <a:fillRef idx="1">
-                    <a:schemeClr val="accent1"/>
-                  </a:fillRef>
-                  <a:effectRef idx="0">
-                    <a:schemeClr val="accent1"/>
-                  </a:effectRef>
-                  <a:fontRef idx="minor">
-                    <a:schemeClr val="lt1"/>
-                  </a:fontRef>
-                </p:style>
-                <p:txBody>
-                  <a:bodyPr wrap="none" rtlCol="0" anchor="ctr"/>
-                  <a:lstStyle/>
-                  <a:p>
-                    <a:pPr algn="ctr"/>
-                    <a:r>
-                      <a:rPr lang="en-US" sz="1050" b="1" dirty="0">
-                        <a:solidFill>
-                          <a:schemeClr val="tx1"/>
-                        </a:solidFill>
-                        <a:latin typeface="Courier" pitchFamily="2" charset="0"/>
-                      </a:rPr>
-                      <a:t>US.VA.059</a:t>
-                    </a:r>
-                  </a:p>
-                </p:txBody>
-              </p:sp>
-              <p:grpSp>
-                <p:nvGrpSpPr>
-                  <p:cNvPr id="49" name="Group 48">
-                    <a:extLst>
-                      <a:ext uri="{FF2B5EF4-FFF2-40B4-BE49-F238E27FC236}">
-                        <a16:creationId xmlns:a16="http://schemas.microsoft.com/office/drawing/2014/main" id="{E8D62279-8BEB-EF46-B13C-78BEAAE1D0F2}"/>
-                      </a:ext>
-                    </a:extLst>
-                  </p:cNvPr>
-                  <p:cNvGrpSpPr/>
-                  <p:nvPr/>
-                </p:nvGrpSpPr>
-                <p:grpSpPr>
-                  <a:xfrm>
-                    <a:off x="6467384" y="2234948"/>
-                    <a:ext cx="562912" cy="184970"/>
-                    <a:chOff x="10527402" y="4432299"/>
-                    <a:chExt cx="587793" cy="193146"/>
-                  </a:xfrm>
-                </p:grpSpPr>
-                <p:sp>
-                  <p:nvSpPr>
-                    <p:cNvPr id="47" name="Rectangle 46">
-                      <a:extLst>
-                        <a:ext uri="{FF2B5EF4-FFF2-40B4-BE49-F238E27FC236}">
-                          <a16:creationId xmlns:a16="http://schemas.microsoft.com/office/drawing/2014/main" id="{2B8F79B4-38E0-224D-9914-DAE4EAC71AA7}"/>
-                        </a:ext>
-                      </a:extLst>
-                    </p:cNvPr>
-                    <p:cNvSpPr/>
-                    <p:nvPr/>
-                  </p:nvSpPr>
-                  <p:spPr>
-                    <a:xfrm>
-                      <a:off x="10527402" y="4537030"/>
-                      <a:ext cx="587793" cy="88415"/>
-                    </a:xfrm>
-                    <a:prstGeom prst="rect">
-                      <a:avLst/>
-                    </a:prstGeom>
-                    <a:solidFill>
-                      <a:srgbClr val="FF0000"/>
-                    </a:solidFill>
-                  </p:spPr>
-                  <p:txBody>
-                    <a:bodyPr wrap="square" lIns="0" tIns="0" rIns="0" bIns="0">
-                      <a:spAutoFit/>
-                    </a:bodyPr>
-                    <a:lstStyle/>
-                    <a:p>
-                      <a:pPr lvl="0" algn="ctr"/>
-                      <a:r>
-                        <a:rPr lang="en-US" sz="500" dirty="0">
-                          <a:solidFill>
-                            <a:prstClr val="white"/>
-                          </a:solidFill>
-                          <a:latin typeface="Arial" panose="020B0604020202020204" pitchFamily="34" charset="0"/>
-                          <a:cs typeface="Arial" panose="020B0604020202020204" pitchFamily="34" charset="0"/>
-                        </a:rPr>
-                        <a:t>my name is</a:t>
-                      </a:r>
-                    </a:p>
-                  </p:txBody>
-                </p:sp>
-                <p:sp>
-                  <p:nvSpPr>
-                    <p:cNvPr id="48" name="Rectangle 47">
-                      <a:extLst>
-                        <a:ext uri="{FF2B5EF4-FFF2-40B4-BE49-F238E27FC236}">
-                          <a16:creationId xmlns:a16="http://schemas.microsoft.com/office/drawing/2014/main" id="{8194BA9E-EFC5-9244-969C-9319F8BB5EBF}"/>
-                        </a:ext>
-                      </a:extLst>
-                    </p:cNvPr>
-                    <p:cNvSpPr/>
-                    <p:nvPr/>
-                  </p:nvSpPr>
-                  <p:spPr>
-                    <a:xfrm>
-                      <a:off x="10527402" y="4432299"/>
-                      <a:ext cx="587793" cy="117431"/>
-                    </a:xfrm>
-                    <a:prstGeom prst="rect">
-                      <a:avLst/>
-                    </a:prstGeom>
-                    <a:solidFill>
-                      <a:srgbClr val="FF0000"/>
-                    </a:solidFill>
-                    <a:ln>
-                      <a:noFill/>
-                    </a:ln>
-                  </p:spPr>
-                  <p:style>
-                    <a:lnRef idx="2">
-                      <a:schemeClr val="accent1">
-                        <a:shade val="50000"/>
-                      </a:schemeClr>
-                    </a:lnRef>
-                    <a:fillRef idx="1">
-                      <a:schemeClr val="accent1"/>
-                    </a:fillRef>
-                    <a:effectRef idx="0">
-                      <a:schemeClr val="accent1"/>
-                    </a:effectRef>
-                    <a:fontRef idx="minor">
-                      <a:schemeClr val="lt1"/>
-                    </a:fontRef>
-                  </p:style>
-                  <p:txBody>
-                    <a:bodyPr tIns="0" bIns="0" rtlCol="0" anchor="ctr"/>
-                    <a:lstStyle/>
-                    <a:p>
-                      <a:pPr algn="ctr"/>
-                      <a:r>
-                        <a:rPr lang="en-US" sz="1050" b="1" dirty="0">
-                          <a:solidFill>
-                            <a:schemeClr val="bg1"/>
-                          </a:solidFill>
-                          <a:latin typeface="Arial" panose="020B0604020202020204" pitchFamily="34" charset="0"/>
-                          <a:cs typeface="Arial" panose="020B0604020202020204" pitchFamily="34" charset="0"/>
-                        </a:rPr>
-                        <a:t>Hello</a:t>
-                      </a:r>
-                      <a:endParaRPr lang="en-US" sz="1100" b="1" dirty="0">
-                        <a:solidFill>
-                          <a:schemeClr val="bg1"/>
-                        </a:solidFill>
-                        <a:latin typeface="Arial" panose="020B0604020202020204" pitchFamily="34" charset="0"/>
-                        <a:cs typeface="Arial" panose="020B0604020202020204" pitchFamily="34" charset="0"/>
-                      </a:endParaRPr>
-                    </a:p>
-                  </p:txBody>
-                </p:sp>
-              </p:grpSp>
-            </p:grpSp>
-          </p:grpSp>
-        </p:grpSp>
+            <a:prstGeom prst="rect">
+              <a:avLst/>
+            </a:prstGeom>
+          </p:spPr>
+        </p:pic>
         <p:sp>
           <p:nvSpPr>
-            <p:cNvPr id="2" name="Rectangle 1">
+            <p:cNvPr id="56" name="Oval 55">
               <a:extLst>
                 <a:ext uri="{FF2B5EF4-FFF2-40B4-BE49-F238E27FC236}">
-                  <a16:creationId xmlns:a16="http://schemas.microsoft.com/office/drawing/2014/main" id="{3D597B18-15D0-CE49-8921-55C8EFB43235}"/>
+                  <a16:creationId xmlns:a16="http://schemas.microsoft.com/office/drawing/2014/main" id="{29DAC5E5-0C5A-264D-A948-7C425672456C}"/>
                 </a:ext>
               </a:extLst>
             </p:cNvPr>
-            <p:cNvSpPr/>
+            <p:cNvSpPr>
+              <a:spLocks noChangeAspect="1"/>
+            </p:cNvSpPr>
             <p:nvPr/>
           </p:nvSpPr>
           <p:spPr>
             <a:xfrm>
-              <a:off x="4708502" y="5265390"/>
-              <a:ext cx="2744787" cy="714597"/>
+              <a:off x="5570217" y="617220"/>
+              <a:ext cx="1051560" cy="1051560"/>
             </a:xfrm>
-            <a:prstGeom prst="rect">
+            <a:prstGeom prst="ellipse">
               <a:avLst/>
             </a:prstGeom>
             <a:noFill/>
-            <a:ln>
-              <a:noFill/>
+            <a:ln w="127000" cmpd="sng">
+              <a:solidFill>
+                <a:schemeClr val="tx1"/>
+              </a:solidFill>
             </a:ln>
           </p:spPr>
           <p:style>
@@ -7129,16 +7202,7 @@
             <a:lstStyle/>
             <a:p>
               <a:pPr algn="ctr"/>
-              <a:r>
-                <a:rPr lang="en-US" sz="5400" b="1" dirty="0">
-                  <a:solidFill>
-                    <a:schemeClr val="tx1"/>
-                  </a:solidFill>
-                  <a:latin typeface="Courier" pitchFamily="2" charset="0"/>
-                </a:rPr>
-                <a:t>names</a:t>
-              </a:r>
-              <a:endParaRPr lang="en-US" sz="6600" b="1" dirty="0">
+              <a:endParaRPr lang="en-US" sz="2000" b="1" dirty="0">
                 <a:solidFill>
                   <a:schemeClr val="tx1"/>
                 </a:solidFill>
@@ -7161,7 +7225,7 @@
           </p:nvGrpSpPr>
           <p:grpSpPr>
             <a:xfrm>
-              <a:off x="2952079" y="1541850"/>
+              <a:off x="2967181" y="1391474"/>
               <a:ext cx="6257633" cy="742496"/>
               <a:chOff x="3036375" y="1025684"/>
               <a:chExt cx="6013819" cy="742496"/>
@@ -7214,7 +7278,7 @@
               <a:p>
                 <a:pPr algn="ctr"/>
                 <a:r>
-                  <a:rPr lang="en-US" sz="5400" b="1" dirty="0">
+                  <a:rPr lang="en-US" sz="6600" b="1" dirty="0">
                     <a:solidFill>
                       <a:schemeClr val="tx1"/>
                     </a:solidFill>
@@ -7272,7 +7336,7 @@
               <a:p>
                 <a:pPr algn="ctr"/>
                 <a:r>
-                  <a:rPr lang="en-US" sz="5400" b="1" dirty="0">
+                  <a:rPr lang="en-US" sz="6600" b="1" dirty="0">
                     <a:solidFill>
                       <a:schemeClr val="tx1"/>
                     </a:solidFill>
@@ -7284,6 +7348,395 @@
             </p:txBody>
           </p:sp>
         </p:grpSp>
+        <p:grpSp>
+          <p:nvGrpSpPr>
+            <p:cNvPr id="32" name="Group 31">
+              <a:extLst>
+                <a:ext uri="{FF2B5EF4-FFF2-40B4-BE49-F238E27FC236}">
+                  <a16:creationId xmlns:a16="http://schemas.microsoft.com/office/drawing/2014/main" id="{0A2700E4-0F64-C744-AF70-B86684BCA28B}"/>
+                </a:ext>
+              </a:extLst>
+            </p:cNvPr>
+            <p:cNvGrpSpPr>
+              <a:grpSpLocks noChangeAspect="1"/>
+            </p:cNvGrpSpPr>
+            <p:nvPr/>
+          </p:nvGrpSpPr>
+          <p:grpSpPr>
+            <a:xfrm>
+              <a:off x="3809997" y="1143000"/>
+              <a:ext cx="4572000" cy="4572000"/>
+              <a:chOff x="3808841" y="1398846"/>
+              <a:chExt cx="4574309" cy="4574309"/>
+            </a:xfrm>
+          </p:grpSpPr>
+          <p:pic>
+            <p:nvPicPr>
+              <p:cNvPr id="42" name="Graphic 41" descr="Suit">
+                <a:extLst>
+                  <a:ext uri="{FF2B5EF4-FFF2-40B4-BE49-F238E27FC236}">
+                    <a16:creationId xmlns:a16="http://schemas.microsoft.com/office/drawing/2014/main" id="{AA38583C-16C4-1D41-B2EA-5B5B919D9A31}"/>
+                  </a:ext>
+                </a:extLst>
+              </p:cNvPr>
+              <p:cNvPicPr>
+                <a:picLocks noChangeAspect="1"/>
+              </p:cNvPicPr>
+              <p:nvPr/>
+            </p:nvPicPr>
+            <p:blipFill>
+              <a:blip r:embed="rId5">
+                <a:extLst>
+                  <a:ext uri="{96DAC541-7B7A-43D3-8B79-37D633B846F1}">
+                    <asvg:svgBlip xmlns:asvg="http://schemas.microsoft.com/office/drawing/2016/SVG/main" r:embed="rId6"/>
+                  </a:ext>
+                </a:extLst>
+              </a:blip>
+              <a:stretch>
+                <a:fillRect/>
+              </a:stretch>
+            </p:blipFill>
+            <p:spPr>
+              <a:xfrm>
+                <a:off x="3808841" y="1398846"/>
+                <a:ext cx="4574309" cy="4574309"/>
+              </a:xfrm>
+              <a:prstGeom prst="rect">
+                <a:avLst/>
+              </a:prstGeom>
+            </p:spPr>
+          </p:pic>
+          <p:grpSp>
+            <p:nvGrpSpPr>
+              <p:cNvPr id="9" name="Group 8">
+                <a:extLst>
+                  <a:ext uri="{FF2B5EF4-FFF2-40B4-BE49-F238E27FC236}">
+                    <a16:creationId xmlns:a16="http://schemas.microsoft.com/office/drawing/2014/main" id="{8470CCBD-A67E-CF4A-86EA-A7B69B9C4E1A}"/>
+                  </a:ext>
+                </a:extLst>
+              </p:cNvPr>
+              <p:cNvGrpSpPr/>
+              <p:nvPr/>
+            </p:nvGrpSpPr>
+            <p:grpSpPr>
+              <a:xfrm>
+                <a:off x="6185143" y="2391734"/>
+                <a:ext cx="914400" cy="613497"/>
+                <a:chOff x="6291640" y="2218014"/>
+                <a:chExt cx="914400" cy="613497"/>
+              </a:xfrm>
+            </p:grpSpPr>
+            <p:sp>
+              <p:nvSpPr>
+                <p:cNvPr id="44" name="Rounded Rectangle 43">
+                  <a:extLst>
+                    <a:ext uri="{FF2B5EF4-FFF2-40B4-BE49-F238E27FC236}">
+                      <a16:creationId xmlns:a16="http://schemas.microsoft.com/office/drawing/2014/main" id="{C582140C-FDB0-B84D-B35E-64582B570A90}"/>
+                    </a:ext>
+                  </a:extLst>
+                </p:cNvPr>
+                <p:cNvSpPr/>
+                <p:nvPr/>
+              </p:nvSpPr>
+              <p:spPr>
+                <a:xfrm>
+                  <a:off x="6291640" y="2218014"/>
+                  <a:ext cx="914400" cy="613497"/>
+                </a:xfrm>
+                <a:prstGeom prst="roundRect">
+                  <a:avLst/>
+                </a:prstGeom>
+                <a:solidFill>
+                  <a:srgbClr val="C00000"/>
+                </a:solidFill>
+                <a:ln>
+                  <a:noFill/>
+                </a:ln>
+              </p:spPr>
+              <p:style>
+                <a:lnRef idx="2">
+                  <a:schemeClr val="accent1">
+                    <a:shade val="50000"/>
+                  </a:schemeClr>
+                </a:lnRef>
+                <a:fillRef idx="1">
+                  <a:schemeClr val="accent1"/>
+                </a:fillRef>
+                <a:effectRef idx="0">
+                  <a:schemeClr val="accent1"/>
+                </a:effectRef>
+                <a:fontRef idx="minor">
+                  <a:schemeClr val="lt1"/>
+                </a:fontRef>
+              </p:style>
+              <p:txBody>
+                <a:bodyPr rtlCol="0" anchor="ctr"/>
+                <a:lstStyle/>
+                <a:p>
+                  <a:pPr algn="ctr"/>
+                  <a:endParaRPr lang="en-US" sz="600" i="1" dirty="0"/>
+                </a:p>
+              </p:txBody>
+            </p:sp>
+            <p:sp>
+              <p:nvSpPr>
+                <p:cNvPr id="45" name="Rectangle 44">
+                  <a:extLst>
+                    <a:ext uri="{FF2B5EF4-FFF2-40B4-BE49-F238E27FC236}">
+                      <a16:creationId xmlns:a16="http://schemas.microsoft.com/office/drawing/2014/main" id="{07630879-C065-0243-AA6C-664B62D4C3E2}"/>
+                    </a:ext>
+                  </a:extLst>
+                </p:cNvPr>
+                <p:cNvSpPr/>
+                <p:nvPr/>
+              </p:nvSpPr>
+              <p:spPr>
+                <a:xfrm>
+                  <a:off x="6291640" y="2436852"/>
+                  <a:ext cx="914400" cy="320040"/>
+                </a:xfrm>
+                <a:prstGeom prst="rect">
+                  <a:avLst/>
+                </a:prstGeom>
+                <a:solidFill>
+                  <a:schemeClr val="bg1"/>
+                </a:solidFill>
+                <a:ln>
+                  <a:noFill/>
+                </a:ln>
+              </p:spPr>
+              <p:style>
+                <a:lnRef idx="2">
+                  <a:schemeClr val="accent1">
+                    <a:shade val="50000"/>
+                  </a:schemeClr>
+                </a:lnRef>
+                <a:fillRef idx="1">
+                  <a:schemeClr val="accent1"/>
+                </a:fillRef>
+                <a:effectRef idx="0">
+                  <a:schemeClr val="accent1"/>
+                </a:effectRef>
+                <a:fontRef idx="minor">
+                  <a:schemeClr val="lt1"/>
+                </a:fontRef>
+              </p:style>
+              <p:txBody>
+                <a:bodyPr wrap="none" rtlCol="0" anchor="ctr"/>
+                <a:lstStyle/>
+                <a:p>
+                  <a:pPr algn="ctr"/>
+                  <a:r>
+                    <a:rPr lang="en-US" sz="1200" b="1" dirty="0">
+                      <a:solidFill>
+                        <a:schemeClr val="tx1"/>
+                      </a:solidFill>
+                      <a:latin typeface="Courier" pitchFamily="2" charset="0"/>
+                    </a:rPr>
+                    <a:t>US.VA.059</a:t>
+                  </a:r>
+                </a:p>
+              </p:txBody>
+            </p:sp>
+            <p:grpSp>
+              <p:nvGrpSpPr>
+                <p:cNvPr id="49" name="Group 48">
+                  <a:extLst>
+                    <a:ext uri="{FF2B5EF4-FFF2-40B4-BE49-F238E27FC236}">
+                      <a16:creationId xmlns:a16="http://schemas.microsoft.com/office/drawing/2014/main" id="{E8D62279-8BEB-EF46-B13C-78BEAAE1D0F2}"/>
+                    </a:ext>
+                  </a:extLst>
+                </p:cNvPr>
+                <p:cNvGrpSpPr/>
+                <p:nvPr/>
+              </p:nvGrpSpPr>
+              <p:grpSpPr>
+                <a:xfrm>
+                  <a:off x="6467384" y="2234948"/>
+                  <a:ext cx="562912" cy="184970"/>
+                  <a:chOff x="10527402" y="4432299"/>
+                  <a:chExt cx="587793" cy="193146"/>
+                </a:xfrm>
+              </p:grpSpPr>
+              <p:sp>
+                <p:nvSpPr>
+                  <p:cNvPr id="47" name="Rectangle 46">
+                    <a:extLst>
+                      <a:ext uri="{FF2B5EF4-FFF2-40B4-BE49-F238E27FC236}">
+                        <a16:creationId xmlns:a16="http://schemas.microsoft.com/office/drawing/2014/main" id="{2B8F79B4-38E0-224D-9914-DAE4EAC71AA7}"/>
+                      </a:ext>
+                    </a:extLst>
+                  </p:cNvPr>
+                  <p:cNvSpPr/>
+                  <p:nvPr/>
+                </p:nvSpPr>
+                <p:spPr>
+                  <a:xfrm>
+                    <a:off x="10527402" y="4537030"/>
+                    <a:ext cx="587793" cy="88415"/>
+                  </a:xfrm>
+                  <a:prstGeom prst="rect">
+                    <a:avLst/>
+                  </a:prstGeom>
+                  <a:solidFill>
+                    <a:srgbClr val="C00000"/>
+                  </a:solidFill>
+                </p:spPr>
+                <p:txBody>
+                  <a:bodyPr wrap="square" lIns="0" tIns="0" rIns="0" bIns="0">
+                    <a:spAutoFit/>
+                  </a:bodyPr>
+                  <a:lstStyle/>
+                  <a:p>
+                    <a:pPr lvl="0" algn="ctr"/>
+                    <a:r>
+                      <a:rPr lang="en-US" sz="500" dirty="0">
+                        <a:solidFill>
+                          <a:prstClr val="white"/>
+                        </a:solidFill>
+                        <a:latin typeface="Arial" panose="020B0604020202020204" pitchFamily="34" charset="0"/>
+                        <a:cs typeface="Arial" panose="020B0604020202020204" pitchFamily="34" charset="0"/>
+                      </a:rPr>
+                      <a:t>my name is</a:t>
+                    </a:r>
+                  </a:p>
+                </p:txBody>
+              </p:sp>
+              <p:sp>
+                <p:nvSpPr>
+                  <p:cNvPr id="48" name="Rectangle 47">
+                    <a:extLst>
+                      <a:ext uri="{FF2B5EF4-FFF2-40B4-BE49-F238E27FC236}">
+                        <a16:creationId xmlns:a16="http://schemas.microsoft.com/office/drawing/2014/main" id="{8194BA9E-EFC5-9244-969C-9319F8BB5EBF}"/>
+                      </a:ext>
+                    </a:extLst>
+                  </p:cNvPr>
+                  <p:cNvSpPr/>
+                  <p:nvPr/>
+                </p:nvSpPr>
+                <p:spPr>
+                  <a:xfrm>
+                    <a:off x="10527402" y="4432299"/>
+                    <a:ext cx="587793" cy="117431"/>
+                  </a:xfrm>
+                  <a:prstGeom prst="rect">
+                    <a:avLst/>
+                  </a:prstGeom>
+                  <a:solidFill>
+                    <a:srgbClr val="C00000"/>
+                  </a:solidFill>
+                  <a:ln>
+                    <a:noFill/>
+                  </a:ln>
+                </p:spPr>
+                <p:style>
+                  <a:lnRef idx="2">
+                    <a:schemeClr val="accent1">
+                      <a:shade val="50000"/>
+                    </a:schemeClr>
+                  </a:lnRef>
+                  <a:fillRef idx="1">
+                    <a:schemeClr val="accent1"/>
+                  </a:fillRef>
+                  <a:effectRef idx="0">
+                    <a:schemeClr val="accent1"/>
+                  </a:effectRef>
+                  <a:fontRef idx="minor">
+                    <a:schemeClr val="lt1"/>
+                  </a:fontRef>
+                </p:style>
+                <p:txBody>
+                  <a:bodyPr tIns="0" bIns="0" rtlCol="0" anchor="ctr"/>
+                  <a:lstStyle/>
+                  <a:p>
+                    <a:pPr algn="ctr"/>
+                    <a:r>
+                      <a:rPr lang="en-US" sz="1050" b="1" dirty="0">
+                        <a:solidFill>
+                          <a:schemeClr val="bg1"/>
+                        </a:solidFill>
+                        <a:latin typeface="Arial" panose="020B0604020202020204" pitchFamily="34" charset="0"/>
+                        <a:cs typeface="Arial" panose="020B0604020202020204" pitchFamily="34" charset="0"/>
+                      </a:rPr>
+                      <a:t>Hello</a:t>
+                    </a:r>
+                    <a:endParaRPr lang="en-US" sz="1100" b="1" dirty="0">
+                      <a:solidFill>
+                        <a:schemeClr val="bg1"/>
+                      </a:solidFill>
+                      <a:latin typeface="Arial" panose="020B0604020202020204" pitchFamily="34" charset="0"/>
+                      <a:cs typeface="Arial" panose="020B0604020202020204" pitchFamily="34" charset="0"/>
+                    </a:endParaRPr>
+                  </a:p>
+                </p:txBody>
+              </p:sp>
+            </p:grpSp>
+          </p:grpSp>
+        </p:grpSp>
+        <p:sp>
+          <p:nvSpPr>
+            <p:cNvPr id="2" name="Rectangle 1">
+              <a:extLst>
+                <a:ext uri="{FF2B5EF4-FFF2-40B4-BE49-F238E27FC236}">
+                  <a16:creationId xmlns:a16="http://schemas.microsoft.com/office/drawing/2014/main" id="{3D597B18-15D0-CE49-8921-55C8EFB43235}"/>
+                </a:ext>
+              </a:extLst>
+            </p:cNvPr>
+            <p:cNvSpPr/>
+            <p:nvPr/>
+          </p:nvSpPr>
+          <p:spPr>
+            <a:xfrm>
+              <a:off x="4723604" y="5000403"/>
+              <a:ext cx="2744787" cy="714597"/>
+            </a:xfrm>
+            <a:prstGeom prst="rect">
+              <a:avLst/>
+            </a:prstGeom>
+            <a:noFill/>
+            <a:ln>
+              <a:noFill/>
+            </a:ln>
+          </p:spPr>
+          <p:style>
+            <a:lnRef idx="2">
+              <a:schemeClr val="accent1">
+                <a:shade val="50000"/>
+              </a:schemeClr>
+            </a:lnRef>
+            <a:fillRef idx="1">
+              <a:schemeClr val="accent1"/>
+            </a:fillRef>
+            <a:effectRef idx="0">
+              <a:schemeClr val="accent1"/>
+            </a:effectRef>
+            <a:fontRef idx="minor">
+              <a:schemeClr val="lt1"/>
+            </a:fontRef>
+          </p:style>
+          <p:txBody>
+            <a:bodyPr wrap="none" lIns="0" tIns="0" rIns="0" bIns="0" rtlCol="0" anchor="ctr"/>
+            <a:lstStyle/>
+            <a:p>
+              <a:pPr algn="ctr"/>
+              <a:r>
+                <a:rPr lang="en-US" sz="6600" b="1" dirty="0">
+                  <a:solidFill>
+                    <a:schemeClr val="tx1"/>
+                  </a:solidFill>
+                  <a:latin typeface="Courier" pitchFamily="2" charset="0"/>
+                </a:rPr>
+                <a:t>names</a:t>
+              </a:r>
+              <a:endParaRPr lang="en-US" sz="8000" b="1" dirty="0">
+                <a:solidFill>
+                  <a:schemeClr val="tx1"/>
+                </a:solidFill>
+                <a:latin typeface="Courier" pitchFamily="2" charset="0"/>
+              </a:endParaRPr>
+            </a:p>
+          </p:txBody>
+        </p:sp>
       </p:grpSp>
     </p:spTree>
     <p:extLst>
@@ -7591,4 +8044,299 @@
     </a:ext>
   </a:extLst>
 </a:theme>
+</file>
+
+<file path=ppt/theme/theme2.xml><?xml version="1.0" encoding="utf-8"?>
+<a:theme xmlns:a="http://schemas.openxmlformats.org/drawingml/2006/main" name="Office Theme">
+  <a:themeElements>
+    <a:clrScheme name="Office">
+      <a:dk1>
+        <a:sysClr val="windowText" lastClr="000000"/>
+      </a:dk1>
+      <a:lt1>
+        <a:sysClr val="window" lastClr="FFFFFF"/>
+      </a:lt1>
+      <a:dk2>
+        <a:srgbClr val="44546A"/>
+      </a:dk2>
+      <a:lt2>
+        <a:srgbClr val="E7E6E6"/>
+      </a:lt2>
+      <a:accent1>
+        <a:srgbClr val="4472C4"/>
+      </a:accent1>
+      <a:accent2>
+        <a:srgbClr val="ED7D31"/>
+      </a:accent2>
+      <a:accent3>
+        <a:srgbClr val="A5A5A5"/>
+      </a:accent3>
+      <a:accent4>
+        <a:srgbClr val="FFC000"/>
+      </a:accent4>
+      <a:accent5>
+        <a:srgbClr val="5B9BD5"/>
+      </a:accent5>
+      <a:accent6>
+        <a:srgbClr val="70AD47"/>
+      </a:accent6>
+      <a:hlink>
+        <a:srgbClr val="0563C1"/>
+      </a:hlink>
+      <a:folHlink>
+        <a:srgbClr val="954F72"/>
+      </a:folHlink>
+    </a:clrScheme>
+    <a:fontScheme name="Office">
+      <a:majorFont>
+        <a:latin typeface="Calibri Light" panose="020F0302020204030204"/>
+        <a:ea typeface=""/>
+        <a:cs typeface=""/>
+        <a:font script="Jpan" typeface="游ゴシック Light"/>
+        <a:font script="Hang" typeface="맑은 고딕"/>
+        <a:font script="Hans" typeface="等线 Light"/>
+        <a:font script="Hant" typeface="新細明體"/>
+        <a:font script="Arab" typeface="Times New Roman"/>
+        <a:font script="Hebr" typeface="Times New Roman"/>
+        <a:font script="Thai" typeface="Angsana New"/>
+        <a:font script="Ethi" typeface="Nyala"/>
+        <a:font script="Beng" typeface="Vrinda"/>
+        <a:font script="Gujr" typeface="Shruti"/>
+        <a:font script="Khmr" typeface="MoolBoran"/>
+        <a:font script="Knda" typeface="Tunga"/>
+        <a:font script="Guru" typeface="Raavi"/>
+        <a:font script="Cans" typeface="Euphemia"/>
+        <a:font script="Cher" typeface="Plantagenet Cherokee"/>
+        <a:font script="Yiii" typeface="Microsoft Yi Baiti"/>
+        <a:font script="Tibt" typeface="Microsoft Himalaya"/>
+        <a:font script="Thaa" typeface="MV Boli"/>
+        <a:font script="Deva" typeface="Mangal"/>
+        <a:font script="Telu" typeface="Gautami"/>
+        <a:font script="Taml" typeface="Latha"/>
+        <a:font script="Syrc" typeface="Estrangelo Edessa"/>
+        <a:font script="Orya" typeface="Kalinga"/>
+        <a:font script="Mlym" typeface="Kartika"/>
+        <a:font script="Laoo" typeface="DokChampa"/>
+        <a:font script="Sinh" typeface="Iskoola Pota"/>
+        <a:font script="Mong" typeface="Mongolian Baiti"/>
+        <a:font script="Viet" typeface="Times New Roman"/>
+        <a:font script="Uigh" typeface="Microsoft Uighur"/>
+        <a:font script="Geor" typeface="Sylfaen"/>
+        <a:font script="Armn" typeface="Arial"/>
+        <a:font script="Bugi" typeface="Leelawadee UI"/>
+        <a:font script="Bopo" typeface="Microsoft JhengHei"/>
+        <a:font script="Java" typeface="Javanese Text"/>
+        <a:font script="Lisu" typeface="Segoe UI"/>
+        <a:font script="Mymr" typeface="Myanmar Text"/>
+        <a:font script="Nkoo" typeface="Ebrima"/>
+        <a:font script="Olck" typeface="Nirmala UI"/>
+        <a:font script="Osma" typeface="Ebrima"/>
+        <a:font script="Phag" typeface="Phagspa"/>
+        <a:font script="Syrn" typeface="Estrangelo Edessa"/>
+        <a:font script="Syrj" typeface="Estrangelo Edessa"/>
+        <a:font script="Syre" typeface="Estrangelo Edessa"/>
+        <a:font script="Sora" typeface="Nirmala UI"/>
+        <a:font script="Tale" typeface="Microsoft Tai Le"/>
+        <a:font script="Talu" typeface="Microsoft New Tai Lue"/>
+        <a:font script="Tfng" typeface="Ebrima"/>
+      </a:majorFont>
+      <a:minorFont>
+        <a:latin typeface="Calibri" panose="020F0502020204030204"/>
+        <a:ea typeface=""/>
+        <a:cs typeface=""/>
+        <a:font script="Jpan" typeface="游ゴシック"/>
+        <a:font script="Hang" typeface="맑은 고딕"/>
+        <a:font script="Hans" typeface="等线"/>
+        <a:font script="Hant" typeface="新細明體"/>
+        <a:font script="Arab" typeface="Arial"/>
+        <a:font script="Hebr" typeface="Arial"/>
+        <a:font script="Thai" typeface="Cordia New"/>
+        <a:font script="Ethi" typeface="Nyala"/>
+        <a:font script="Beng" typeface="Vrinda"/>
+        <a:font script="Gujr" typeface="Shruti"/>
+        <a:font script="Khmr" typeface="DaunPenh"/>
+        <a:font script="Knda" typeface="Tunga"/>
+        <a:font script="Guru" typeface="Raavi"/>
+        <a:font script="Cans" typeface="Euphemia"/>
+        <a:font script="Cher" typeface="Plantagenet Cherokee"/>
+        <a:font script="Yiii" typeface="Microsoft Yi Baiti"/>
+        <a:font script="Tibt" typeface="Microsoft Himalaya"/>
+        <a:font script="Thaa" typeface="MV Boli"/>
+        <a:font script="Deva" typeface="Mangal"/>
+        <a:font script="Telu" typeface="Gautami"/>
+        <a:font script="Taml" typeface="Latha"/>
+        <a:font script="Syrc" typeface="Estrangelo Edessa"/>
+        <a:font script="Orya" typeface="Kalinga"/>
+        <a:font script="Mlym" typeface="Kartika"/>
+        <a:font script="Laoo" typeface="DokChampa"/>
+        <a:font script="Sinh" typeface="Iskoola Pota"/>
+        <a:font script="Mong" typeface="Mongolian Baiti"/>
+        <a:font script="Viet" typeface="Arial"/>
+        <a:font script="Uigh" typeface="Microsoft Uighur"/>
+        <a:font script="Geor" typeface="Sylfaen"/>
+        <a:font script="Armn" typeface="Arial"/>
+        <a:font script="Bugi" typeface="Leelawadee UI"/>
+        <a:font script="Bopo" typeface="Microsoft JhengHei"/>
+        <a:font script="Java" typeface="Javanese Text"/>
+        <a:font script="Lisu" typeface="Segoe UI"/>
+        <a:font script="Mymr" typeface="Myanmar Text"/>
+        <a:font script="Nkoo" typeface="Ebrima"/>
+        <a:font script="Olck" typeface="Nirmala UI"/>
+        <a:font script="Osma" typeface="Ebrima"/>
+        <a:font script="Phag" typeface="Phagspa"/>
+        <a:font script="Syrn" typeface="Estrangelo Edessa"/>
+        <a:font script="Syrj" typeface="Estrangelo Edessa"/>
+        <a:font script="Syre" typeface="Estrangelo Edessa"/>
+        <a:font script="Sora" typeface="Nirmala UI"/>
+        <a:font script="Tale" typeface="Microsoft Tai Le"/>
+        <a:font script="Talu" typeface="Microsoft New Tai Lue"/>
+        <a:font script="Tfng" typeface="Ebrima"/>
+      </a:minorFont>
+    </a:fontScheme>
+    <a:fmtScheme name="Office">
+      <a:fillStyleLst>
+        <a:solidFill>
+          <a:schemeClr val="phClr"/>
+        </a:solidFill>
+        <a:gradFill rotWithShape="1">
+          <a:gsLst>
+            <a:gs pos="0">
+              <a:schemeClr val="phClr">
+                <a:lumMod val="110000"/>
+                <a:satMod val="105000"/>
+                <a:tint val="67000"/>
+              </a:schemeClr>
+            </a:gs>
+            <a:gs pos="50000">
+              <a:schemeClr val="phClr">
+                <a:lumMod val="105000"/>
+                <a:satMod val="103000"/>
+                <a:tint val="73000"/>
+              </a:schemeClr>
+            </a:gs>
+            <a:gs pos="100000">
+              <a:schemeClr val="phClr">
+                <a:lumMod val="105000"/>
+                <a:satMod val="109000"/>
+                <a:tint val="81000"/>
+              </a:schemeClr>
+            </a:gs>
+          </a:gsLst>
+          <a:lin ang="5400000" scaled="0"/>
+        </a:gradFill>
+        <a:gradFill rotWithShape="1">
+          <a:gsLst>
+            <a:gs pos="0">
+              <a:schemeClr val="phClr">
+                <a:satMod val="103000"/>
+                <a:lumMod val="102000"/>
+                <a:tint val="94000"/>
+              </a:schemeClr>
+            </a:gs>
+            <a:gs pos="50000">
+              <a:schemeClr val="phClr">
+                <a:satMod val="110000"/>
+                <a:lumMod val="100000"/>
+                <a:shade val="100000"/>
+              </a:schemeClr>
+            </a:gs>
+            <a:gs pos="100000">
+              <a:schemeClr val="phClr">
+                <a:lumMod val="99000"/>
+                <a:satMod val="120000"/>
+                <a:shade val="78000"/>
+              </a:schemeClr>
+            </a:gs>
+          </a:gsLst>
+          <a:lin ang="5400000" scaled="0"/>
+        </a:gradFill>
+      </a:fillStyleLst>
+      <a:lnStyleLst>
+        <a:ln w="6350" cap="flat" cmpd="sng" algn="ctr">
+          <a:solidFill>
+            <a:schemeClr val="phClr"/>
+          </a:solidFill>
+          <a:prstDash val="solid"/>
+          <a:miter lim="800000"/>
+        </a:ln>
+        <a:ln w="12700" cap="flat" cmpd="sng" algn="ctr">
+          <a:solidFill>
+            <a:schemeClr val="phClr"/>
+          </a:solidFill>
+          <a:prstDash val="solid"/>
+          <a:miter lim="800000"/>
+        </a:ln>
+        <a:ln w="19050" cap="flat" cmpd="sng" algn="ctr">
+          <a:solidFill>
+            <a:schemeClr val="phClr"/>
+          </a:solidFill>
+          <a:prstDash val="solid"/>
+          <a:miter lim="800000"/>
+        </a:ln>
+      </a:lnStyleLst>
+      <a:effectStyleLst>
+        <a:effectStyle>
+          <a:effectLst/>
+        </a:effectStyle>
+        <a:effectStyle>
+          <a:effectLst/>
+        </a:effectStyle>
+        <a:effectStyle>
+          <a:effectLst>
+            <a:outerShdw blurRad="57150" dist="19050" dir="5400000" algn="ctr" rotWithShape="0">
+              <a:srgbClr val="000000">
+                <a:alpha val="63000"/>
+              </a:srgbClr>
+            </a:outerShdw>
+          </a:effectLst>
+        </a:effectStyle>
+      </a:effectStyleLst>
+      <a:bgFillStyleLst>
+        <a:solidFill>
+          <a:schemeClr val="phClr"/>
+        </a:solidFill>
+        <a:solidFill>
+          <a:schemeClr val="phClr">
+            <a:tint val="95000"/>
+            <a:satMod val="170000"/>
+          </a:schemeClr>
+        </a:solidFill>
+        <a:gradFill rotWithShape="1">
+          <a:gsLst>
+            <a:gs pos="0">
+              <a:schemeClr val="phClr">
+                <a:tint val="93000"/>
+                <a:satMod val="150000"/>
+                <a:shade val="98000"/>
+                <a:lumMod val="102000"/>
+              </a:schemeClr>
+            </a:gs>
+            <a:gs pos="50000">
+              <a:schemeClr val="phClr">
+                <a:tint val="98000"/>
+                <a:satMod val="130000"/>
+                <a:shade val="90000"/>
+                <a:lumMod val="103000"/>
+              </a:schemeClr>
+            </a:gs>
+            <a:gs pos="100000">
+              <a:schemeClr val="phClr">
+                <a:shade val="63000"/>
+                <a:satMod val="120000"/>
+              </a:schemeClr>
+            </a:gs>
+          </a:gsLst>
+          <a:lin ang="5400000" scaled="0"/>
+        </a:gradFill>
+      </a:bgFillStyleLst>
+    </a:fmtScheme>
+  </a:themeElements>
+  <a:objectDefaults/>
+  <a:extraClrSchemeLst/>
+  <a:extLst>
+    <a:ext uri="{05A4C25C-085E-4340-85A3-A5531E510DB2}">
+      <thm15:themeFamily xmlns:thm15="http://schemas.microsoft.com/office/thememl/2012/main" name="Office Theme" id="{62F939B6-93AF-4DB8-9C6B-D6C7DFDC589F}" vid="{4A3C46E8-61CC-4603-A589-7422A47A8E4A}"/>
+    </a:ext>
+  </a:extLst>
+</a:theme>
 </file>
</xml_diff>